<commit_message>
ppt changes i forgot to push lol
</commit_message>
<xml_diff>
--- a/documents/instrument_tuner_presentation.pptx
+++ b/documents/instrument_tuner_presentation.pptx
@@ -4134,8 +4134,8 @@
         </p:blipFill>
         <p:spPr>
           <a:xfrm rot="16200000">
-            <a:off x="7530503" y="2243917"/>
-            <a:ext cx="3771727" cy="3478628"/>
+            <a:off x="6917644" y="2014595"/>
+            <a:ext cx="4345937" cy="4008216"/>
           </a:xfrm>
           <a:prstGeom prst="rect">
             <a:avLst/>
@@ -4156,7 +4156,7 @@
         </p:nvSpPr>
         <p:spPr>
           <a:xfrm>
-            <a:off x="8464491" y="3798565"/>
+            <a:off x="8121591" y="3857414"/>
             <a:ext cx="570452" cy="369332"/>
           </a:xfrm>
           <a:prstGeom prst="rect">
@@ -4260,6 +4260,13 @@
         <p:txBody>
           <a:bodyPr/>
           <a:lstStyle/>
+          <a:p>
+            <a:pPr>
+              <a:buFont typeface="Arial" panose="020B0604020202020204" pitchFamily="34" charset="0"/>
+              <a:buChar char="•"/>
+            </a:pPr>
+            <a:endParaRPr lang="en-US" dirty="0"/>
+          </a:p>
           <a:p>
             <a:pPr>
               <a:buFont typeface="Arial" panose="020B0604020202020204" pitchFamily="34" charset="0"/>
@@ -4491,9 +4498,16 @@
               <a:buFont typeface="Arial" panose="020B0604020202020204" pitchFamily="34" charset="0"/>
               <a:buChar char="•"/>
             </a:pPr>
-            <a:r>
-              <a:rPr lang="en-US" dirty="0"/>
-              <a:t> Some notes start high and decay low</a:t>
+            <a:endParaRPr lang="en-US" dirty="0"/>
+          </a:p>
+          <a:p>
+            <a:pPr>
+              <a:buFont typeface="Arial" panose="020B0604020202020204" pitchFamily="34" charset="0"/>
+              <a:buChar char="•"/>
+            </a:pPr>
+            <a:r>
+              <a:rPr lang="en-US" dirty="0"/>
+              <a:t>Some notes start high and decay low</a:t>
             </a:r>
           </a:p>
           <a:p>
@@ -4685,13 +4699,8 @@
             </a:pPr>
             <a:r>
               <a:rPr lang="en-US" dirty="0"/>
-              <a:t> More tunings and a user interface for </a:t>
-            </a:r>
-            <a:r>
-              <a:rPr lang="en-US"/>
-              <a:t>selecting tunings and displaying notes</a:t>
-            </a:r>
-            <a:endParaRPr lang="en-US" dirty="0"/>
+              <a:t> More tunings and a user interface for selecting tunings and displaying notes</a:t>
+            </a:r>
           </a:p>
           <a:p>
             <a:pPr>

</xml_diff>